<commit_message>
knit to html file
</commit_message>
<xml_diff>
--- a/presentation/Presentation Slides- Food deserts in US.pptx
+++ b/presentation/Presentation Slides- Food deserts in US.pptx
@@ -38836,12 +38836,9 @@
 </file>
 
 <file path=customXml/item1.xml><?xml version="1.0" encoding="utf-8"?>
-<?mso-contentType ?>
-<FormTemplates xmlns="http://schemas.microsoft.com/sharepoint/v3/contenttype/forms">
-  <Display>DocumentLibraryForm</Display>
-  <Edit>DocumentLibraryForm</Edit>
-  <New>DocumentLibraryForm</New>
-</FormTemplates>
+<p:properties xmlns:p="http://schemas.microsoft.com/office/2006/metadata/properties" xmlns:xsi="http://www.w3.org/2001/XMLSchema-instance" xmlns:pc="http://schemas.microsoft.com/office/infopath/2007/PartnerControls">
+  <documentManagement/>
+</p:properties>
 </file>
 
 <file path=customXml/item2.xml><?xml version="1.0" encoding="utf-8"?>
@@ -38971,15 +38968,26 @@
 </file>
 
 <file path=customXml/item3.xml><?xml version="1.0" encoding="utf-8"?>
-<p:properties xmlns:p="http://schemas.microsoft.com/office/2006/metadata/properties" xmlns:xsi="http://www.w3.org/2001/XMLSchema-instance" xmlns:pc="http://schemas.microsoft.com/office/infopath/2007/PartnerControls">
-  <documentManagement/>
-</p:properties>
+<?mso-contentType ?>
+<FormTemplates xmlns="http://schemas.microsoft.com/sharepoint/v3/contenttype/forms">
+  <Display>DocumentLibraryForm</Display>
+  <Edit>DocumentLibraryForm</Edit>
+  <New>DocumentLibraryForm</New>
+</FormTemplates>
 </file>
 
 <file path=customXml/itemProps1.xml><?xml version="1.0" encoding="utf-8"?>
-<ds:datastoreItem xmlns:ds="http://schemas.openxmlformats.org/officeDocument/2006/customXml" ds:itemID="{B17B38D2-646E-49A0-B698-1696F94D5170}">
+<ds:datastoreItem xmlns:ds="http://schemas.openxmlformats.org/officeDocument/2006/customXml" ds:itemID="{19DF537D-7BBF-4912-829F-A8224D9C364E}">
   <ds:schemaRefs>
-    <ds:schemaRef ds:uri="http://schemas.microsoft.com/sharepoint/v3/contenttype/forms"/>
+    <ds:schemaRef ds:uri="58a92a34-6a55-4443-b506-6bf62df04849"/>
+    <ds:schemaRef ds:uri="http://www.w3.org/XML/1998/namespace"/>
+    <ds:schemaRef ds:uri="http://schemas.microsoft.com/office/2006/documentManagement/types"/>
+    <ds:schemaRef ds:uri="http://purl.org/dc/elements/1.1/"/>
+    <ds:schemaRef ds:uri="http://purl.org/dc/terms/"/>
+    <ds:schemaRef ds:uri="http://schemas.microsoft.com/office/2006/metadata/properties"/>
+    <ds:schemaRef ds:uri="http://purl.org/dc/dcmitype/"/>
+    <ds:schemaRef ds:uri="http://schemas.microsoft.com/office/infopath/2007/PartnerControls"/>
+    <ds:schemaRef ds:uri="http://schemas.openxmlformats.org/package/2006/metadata/core-properties"/>
   </ds:schemaRefs>
 </ds:datastoreItem>
 </file>
@@ -39003,17 +39011,9 @@
 </file>
 
 <file path=customXml/itemProps3.xml><?xml version="1.0" encoding="utf-8"?>
-<ds:datastoreItem xmlns:ds="http://schemas.openxmlformats.org/officeDocument/2006/customXml" ds:itemID="{19DF537D-7BBF-4912-829F-A8224D9C364E}">
+<ds:datastoreItem xmlns:ds="http://schemas.openxmlformats.org/officeDocument/2006/customXml" ds:itemID="{B17B38D2-646E-49A0-B698-1696F94D5170}">
   <ds:schemaRefs>
-    <ds:schemaRef ds:uri="58a92a34-6a55-4443-b506-6bf62df04849"/>
-    <ds:schemaRef ds:uri="http://www.w3.org/XML/1998/namespace"/>
-    <ds:schemaRef ds:uri="http://schemas.microsoft.com/office/2006/documentManagement/types"/>
-    <ds:schemaRef ds:uri="http://purl.org/dc/elements/1.1/"/>
-    <ds:schemaRef ds:uri="http://purl.org/dc/terms/"/>
-    <ds:schemaRef ds:uri="http://schemas.microsoft.com/office/2006/metadata/properties"/>
-    <ds:schemaRef ds:uri="http://purl.org/dc/dcmitype/"/>
-    <ds:schemaRef ds:uri="http://schemas.microsoft.com/office/infopath/2007/PartnerControls"/>
-    <ds:schemaRef ds:uri="http://schemas.openxmlformats.org/package/2006/metadata/core-properties"/>
+    <ds:schemaRef ds:uri="http://schemas.microsoft.com/sharepoint/v3/contenttype/forms"/>
   </ds:schemaRefs>
 </ds:datastoreItem>
 </file>
</xml_diff>